<commit_message>
Edits from team meeting
</commit_message>
<xml_diff>
--- a/Team/Threat-risk -enguagement.pptx
+++ b/Team/Threat-risk -enguagement.pptx
@@ -14678,7 +14678,9 @@
         </p:nvSpPr>
         <p:spPr/>
         <p:txBody>
-          <a:bodyPr/>
+          <a:bodyPr>
+            <a:normAutofit lnSpcReduction="10000"/>
+          </a:bodyPr>
           <a:lstStyle/>
           <a:p>
             <a:pPr lvl="0"/>
@@ -14783,8 +14785,28 @@
             <a:pPr lvl="1"/>
             <a:r>
               <a:rPr lang="en-US" dirty="0"/>
-              <a:t>U.S. Information Sharing Environment PMO</a:t>
-            </a:r>
+              <a:t>U.S. Information Sharing Environment </a:t>
+            </a:r>
+            <a:r>
+              <a:rPr lang="en-US" dirty="0" smtClean="0"/>
+              <a:t>PMO</a:t>
+            </a:r>
+          </a:p>
+          <a:p>
+            <a:pPr lvl="1"/>
+            <a:r>
+              <a:rPr lang="en-US" dirty="0" smtClean="0"/>
+              <a:t>FBI </a:t>
+            </a:r>
+            <a:r>
+              <a:rPr lang="en-US" dirty="0" err="1" smtClean="0"/>
+              <a:t>Infogard</a:t>
+            </a:r>
+            <a:endParaRPr lang="en-US" dirty="0" smtClean="0"/>
+          </a:p>
+          <a:p>
+            <a:pPr lvl="1"/>
+            <a:endParaRPr lang="en-US" dirty="0"/>
           </a:p>
           <a:p>
             <a:endParaRPr lang="en-US" dirty="0"/>
@@ -15747,10 +15769,10 @@
           <a:lstStyle/>
           <a:p>
             <a:r>
-              <a:rPr lang="en-US" smtClean="0"/>
+              <a:rPr lang="en-US" dirty="0" smtClean="0"/>
               <a:t>Threat &amp; Risk</a:t>
             </a:r>
-            <a:endParaRPr lang="en-US"/>
+            <a:endParaRPr lang="en-US" dirty="0"/>
           </a:p>
         </p:txBody>
       </p:sp>

</xml_diff>